<commit_message>
chapter 1:write "next morning"
</commit_message>
<xml_diff>
--- a/pptx/chapter-1.pptx
+++ b/pptx/chapter-1.pptx
@@ -9,6 +9,7 @@
     <p:sldId id="257" r:id="rId3"/>
     <p:sldId id="258" r:id="rId4"/>
     <p:sldId id="259" r:id="rId5"/>
+    <p:sldId id="260" r:id="rId6"/>
   </p:sldIdLst>
   <p:sldSz cx="9144000" cy="6858000" type="screen4x3"/>
   <p:notesSz cx="6858000" cy="9144000"/>
@@ -4820,11 +4821,7 @@
           <a:p>
             <a:r>
               <a:rPr lang="en-US" altLang="ja-JP" dirty="0" smtClean="0"/>
-              <a:t>\</a:t>
-            </a:r>
-            <a:r>
-              <a:rPr lang="en-US" altLang="ja-JP" dirty="0" smtClean="0"/>
-              <a:t>doc *</a:t>
+              <a:t>\doc *</a:t>
             </a:r>
             <a:endParaRPr kumimoji="1" lang="ja-JP" altLang="en-US" dirty="0"/>
           </a:p>
@@ -5319,11 +5316,7 @@
           <a:p>
             <a:r>
               <a:rPr lang="en-US" altLang="ja-JP" dirty="0" smtClean="0"/>
-              <a:t>\</a:t>
-            </a:r>
-            <a:r>
-              <a:rPr lang="en-US" altLang="ja-JP" dirty="0" smtClean="0"/>
-              <a:t>doc *</a:t>
+              <a:t>\doc *</a:t>
             </a:r>
             <a:endParaRPr kumimoji="1" lang="ja-JP" altLang="en-US" dirty="0"/>
           </a:p>
@@ -5614,11 +5607,7 @@
           <a:p>
             <a:r>
               <a:rPr lang="en-US" altLang="ja-JP" dirty="0" smtClean="0"/>
-              <a:t>\</a:t>
-            </a:r>
-            <a:r>
-              <a:rPr lang="en-US" altLang="ja-JP" dirty="0" smtClean="0"/>
-              <a:t>doc</a:t>
+              <a:t>\doc</a:t>
             </a:r>
             <a:r>
               <a:rPr lang="ja-JP" altLang="en-US" dirty="0"/>
@@ -5911,6 +5900,491 @@
     <p:extLst>
       <p:ext uri="{BB962C8B-B14F-4D97-AF65-F5344CB8AC3E}">
         <p14:creationId xmlns:p14="http://schemas.microsoft.com/office/powerpoint/2010/main" val="734695724"/>
+      </p:ext>
+    </p:extLst>
+  </p:cSld>
+  <p:clrMapOvr>
+    <a:masterClrMapping/>
+  </p:clrMapOvr>
+</p:sld>
+</file>
+
+<file path=ppt/slides/slide5.xml><?xml version="1.0" encoding="utf-8"?>
+<p:sld xmlns:a="http://schemas.openxmlformats.org/drawingml/2006/main" xmlns:r="http://schemas.openxmlformats.org/officeDocument/2006/relationships" xmlns:p="http://schemas.openxmlformats.org/presentationml/2006/main">
+  <p:cSld>
+    <p:spTree>
+      <p:nvGrpSpPr>
+        <p:cNvPr id="1" name=""/>
+        <p:cNvGrpSpPr/>
+        <p:nvPr/>
+      </p:nvGrpSpPr>
+      <p:grpSpPr>
+        <a:xfrm>
+          <a:off x="0" y="0"/>
+          <a:ext cx="0" cy="0"/>
+          <a:chOff x="0" y="0"/>
+          <a:chExt cx="0" cy="0"/>
+        </a:xfrm>
+      </p:grpSpPr>
+      <p:sp>
+        <p:nvSpPr>
+          <p:cNvPr id="5" name="正方形/長方形 4"/>
+          <p:cNvSpPr/>
+          <p:nvPr/>
+        </p:nvSpPr>
+        <p:spPr>
+          <a:xfrm>
+            <a:off x="1816608" y="1203960"/>
+            <a:ext cx="2523744" cy="2014728"/>
+          </a:xfrm>
+          <a:prstGeom prst="rect">
+            <a:avLst/>
+          </a:prstGeom>
+        </p:spPr>
+        <p:style>
+          <a:lnRef idx="1">
+            <a:schemeClr val="accent1"/>
+          </a:lnRef>
+          <a:fillRef idx="2">
+            <a:schemeClr val="accent1"/>
+          </a:fillRef>
+          <a:effectRef idx="1">
+            <a:schemeClr val="accent1"/>
+          </a:effectRef>
+          <a:fontRef idx="minor">
+            <a:schemeClr val="dk1"/>
+          </a:fontRef>
+        </p:style>
+        <p:txBody>
+          <a:bodyPr rtlCol="0" anchor="ctr"/>
+          <a:lstStyle/>
+          <a:p>
+            <a:pPr algn="ctr"/>
+            <a:endParaRPr kumimoji="1" lang="ja-JP" altLang="en-US" dirty="0"/>
+          </a:p>
+        </p:txBody>
+      </p:sp>
+      <p:pic>
+        <p:nvPicPr>
+          <p:cNvPr id="4" name="図 3"/>
+          <p:cNvPicPr>
+            <a:picLocks noChangeAspect="1"/>
+          </p:cNvPicPr>
+          <p:nvPr/>
+        </p:nvPicPr>
+        <p:blipFill>
+          <a:blip r:embed="rId2" cstate="print">
+            <a:extLst>
+              <a:ext uri="{28A0092B-C50C-407E-A947-70E740481C1C}">
+                <a14:useLocalDpi xmlns:a14="http://schemas.microsoft.com/office/drawing/2010/main" val="0"/>
+              </a:ext>
+            </a:extLst>
+          </a:blip>
+          <a:stretch>
+            <a:fillRect/>
+          </a:stretch>
+        </p:blipFill>
+        <p:spPr>
+          <a:xfrm>
+            <a:off x="1298905" y="725424"/>
+            <a:ext cx="690177" cy="957072"/>
+          </a:xfrm>
+          <a:prstGeom prst="rect">
+            <a:avLst/>
+          </a:prstGeom>
+        </p:spPr>
+      </p:pic>
+      <p:pic>
+        <p:nvPicPr>
+          <p:cNvPr id="6" name="図 5"/>
+          <p:cNvPicPr>
+            <a:picLocks noChangeAspect="1"/>
+          </p:cNvPicPr>
+          <p:nvPr/>
+        </p:nvPicPr>
+        <p:blipFill>
+          <a:blip r:embed="rId3" cstate="print">
+            <a:extLst>
+              <a:ext uri="{28A0092B-C50C-407E-A947-70E740481C1C}">
+                <a14:useLocalDpi xmlns:a14="http://schemas.microsoft.com/office/drawing/2010/main" val="0"/>
+              </a:ext>
+            </a:extLst>
+          </a:blip>
+          <a:stretch>
+            <a:fillRect/>
+          </a:stretch>
+        </p:blipFill>
+        <p:spPr>
+          <a:xfrm>
+            <a:off x="2031411" y="1444809"/>
+            <a:ext cx="475374" cy="475374"/>
+          </a:xfrm>
+          <a:prstGeom prst="rect">
+            <a:avLst/>
+          </a:prstGeom>
+        </p:spPr>
+      </p:pic>
+      <p:sp>
+        <p:nvSpPr>
+          <p:cNvPr id="7" name="テキスト ボックス 6"/>
+          <p:cNvSpPr txBox="1"/>
+          <p:nvPr/>
+        </p:nvSpPr>
+        <p:spPr>
+          <a:xfrm>
+            <a:off x="2506785" y="1497830"/>
+            <a:ext cx="1734706" cy="369332"/>
+          </a:xfrm>
+          <a:prstGeom prst="rect">
+            <a:avLst/>
+          </a:prstGeom>
+          <a:noFill/>
+        </p:spPr>
+        <p:txBody>
+          <a:bodyPr wrap="none" rtlCol="0">
+            <a:spAutoFit/>
+          </a:bodyPr>
+          <a:lstStyle/>
+          <a:p>
+            <a:r>
+              <a:rPr lang="en-US" altLang="ja-JP" dirty="0" smtClean="0"/>
+              <a:t>\\filesvr\shared</a:t>
+            </a:r>
+            <a:endParaRPr kumimoji="1" lang="ja-JP" altLang="en-US" dirty="0"/>
+          </a:p>
+        </p:txBody>
+      </p:sp>
+      <p:pic>
+        <p:nvPicPr>
+          <p:cNvPr id="8" name="図 7"/>
+          <p:cNvPicPr>
+            <a:picLocks noChangeAspect="1"/>
+          </p:cNvPicPr>
+          <p:nvPr/>
+        </p:nvPicPr>
+        <p:blipFill>
+          <a:blip r:embed="rId3" cstate="print">
+            <a:extLst>
+              <a:ext uri="{28A0092B-C50C-407E-A947-70E740481C1C}">
+                <a14:useLocalDpi xmlns:a14="http://schemas.microsoft.com/office/drawing/2010/main" val="0"/>
+              </a:ext>
+            </a:extLst>
+          </a:blip>
+          <a:stretch>
+            <a:fillRect/>
+          </a:stretch>
+        </p:blipFill>
+        <p:spPr>
+          <a:xfrm>
+            <a:off x="2409363" y="2081033"/>
+            <a:ext cx="475374" cy="475374"/>
+          </a:xfrm>
+          <a:prstGeom prst="rect">
+            <a:avLst/>
+          </a:prstGeom>
+        </p:spPr>
+      </p:pic>
+      <p:sp>
+        <p:nvSpPr>
+          <p:cNvPr id="9" name="テキスト ボックス 8"/>
+          <p:cNvSpPr txBox="1"/>
+          <p:nvPr/>
+        </p:nvSpPr>
+        <p:spPr>
+          <a:xfrm>
+            <a:off x="2884737" y="2134054"/>
+            <a:ext cx="643125" cy="369332"/>
+          </a:xfrm>
+          <a:prstGeom prst="rect">
+            <a:avLst/>
+          </a:prstGeom>
+          <a:noFill/>
+        </p:spPr>
+        <p:txBody>
+          <a:bodyPr wrap="none" rtlCol="0">
+            <a:spAutoFit/>
+          </a:bodyPr>
+          <a:lstStyle/>
+          <a:p>
+            <a:r>
+              <a:rPr lang="en-US" altLang="ja-JP" dirty="0" smtClean="0"/>
+              <a:t>\doc</a:t>
+            </a:r>
+            <a:endParaRPr kumimoji="1" lang="ja-JP" altLang="en-US" dirty="0"/>
+          </a:p>
+        </p:txBody>
+      </p:sp>
+      <p:pic>
+        <p:nvPicPr>
+          <p:cNvPr id="10" name="図 9"/>
+          <p:cNvPicPr>
+            <a:picLocks noChangeAspect="1"/>
+          </p:cNvPicPr>
+          <p:nvPr/>
+        </p:nvPicPr>
+        <p:blipFill>
+          <a:blip r:embed="rId3" cstate="print">
+            <a:extLst>
+              <a:ext uri="{28A0092B-C50C-407E-A947-70E740481C1C}">
+                <a14:useLocalDpi xmlns:a14="http://schemas.microsoft.com/office/drawing/2010/main" val="0"/>
+              </a:ext>
+            </a:extLst>
+          </a:blip>
+          <a:stretch>
+            <a:fillRect/>
+          </a:stretch>
+        </p:blipFill>
+        <p:spPr>
+          <a:xfrm>
+            <a:off x="2409363" y="2612590"/>
+            <a:ext cx="475374" cy="475374"/>
+          </a:xfrm>
+          <a:prstGeom prst="rect">
+            <a:avLst/>
+          </a:prstGeom>
+        </p:spPr>
+      </p:pic>
+      <p:sp>
+        <p:nvSpPr>
+          <p:cNvPr id="11" name="テキスト ボックス 10"/>
+          <p:cNvSpPr txBox="1"/>
+          <p:nvPr/>
+        </p:nvSpPr>
+        <p:spPr>
+          <a:xfrm>
+            <a:off x="2884737" y="2665611"/>
+            <a:ext cx="565989" cy="369332"/>
+          </a:xfrm>
+          <a:prstGeom prst="rect">
+            <a:avLst/>
+          </a:prstGeom>
+          <a:noFill/>
+        </p:spPr>
+        <p:txBody>
+          <a:bodyPr wrap="none" rtlCol="0">
+            <a:spAutoFit/>
+          </a:bodyPr>
+          <a:lstStyle/>
+          <a:p>
+            <a:r>
+              <a:rPr lang="en-US" altLang="ja-JP" dirty="0" smtClean="0"/>
+              <a:t>\</a:t>
+            </a:r>
+            <a:r>
+              <a:rPr lang="en-US" altLang="ja-JP" dirty="0" err="1" smtClean="0"/>
+              <a:t>src</a:t>
+            </a:r>
+            <a:endParaRPr kumimoji="1" lang="ja-JP" altLang="en-US" dirty="0"/>
+          </a:p>
+        </p:txBody>
+      </p:sp>
+      <p:cxnSp>
+        <p:nvCxnSpPr>
+          <p:cNvPr id="13" name="カギ線コネクタ 12"/>
+          <p:cNvCxnSpPr>
+            <a:stCxn id="6" idx="2"/>
+            <a:endCxn id="8" idx="1"/>
+          </p:cNvCxnSpPr>
+          <p:nvPr/>
+        </p:nvCxnSpPr>
+        <p:spPr>
+          <a:xfrm rot="16200000" flipH="1">
+            <a:off x="2139962" y="2049318"/>
+            <a:ext cx="398537" cy="140265"/>
+          </a:xfrm>
+          <a:prstGeom prst="bentConnector2">
+            <a:avLst/>
+          </a:prstGeom>
+        </p:spPr>
+        <p:style>
+          <a:lnRef idx="1">
+            <a:schemeClr val="dk1"/>
+          </a:lnRef>
+          <a:fillRef idx="0">
+            <a:schemeClr val="dk1"/>
+          </a:fillRef>
+          <a:effectRef idx="0">
+            <a:schemeClr val="dk1"/>
+          </a:effectRef>
+          <a:fontRef idx="minor">
+            <a:schemeClr val="tx1"/>
+          </a:fontRef>
+        </p:style>
+      </p:cxnSp>
+      <p:cxnSp>
+        <p:nvCxnSpPr>
+          <p:cNvPr id="15" name="カギ線コネクタ 14"/>
+          <p:cNvCxnSpPr>
+            <a:endCxn id="10" idx="1"/>
+          </p:cNvCxnSpPr>
+          <p:nvPr/>
+        </p:nvCxnSpPr>
+        <p:spPr>
+          <a:xfrm rot="16200000" flipH="1">
+            <a:off x="1902275" y="2343188"/>
+            <a:ext cx="873911" cy="140265"/>
+          </a:xfrm>
+          <a:prstGeom prst="bentConnector2">
+            <a:avLst/>
+          </a:prstGeom>
+        </p:spPr>
+        <p:style>
+          <a:lnRef idx="1">
+            <a:schemeClr val="dk1"/>
+          </a:lnRef>
+          <a:fillRef idx="0">
+            <a:schemeClr val="dk1"/>
+          </a:fillRef>
+          <a:effectRef idx="0">
+            <a:schemeClr val="dk1"/>
+          </a:effectRef>
+          <a:fontRef idx="minor">
+            <a:schemeClr val="tx1"/>
+          </a:fontRef>
+        </p:style>
+      </p:cxnSp>
+      <p:sp>
+        <p:nvSpPr>
+          <p:cNvPr id="3" name="右矢印 2"/>
+          <p:cNvSpPr/>
+          <p:nvPr/>
+        </p:nvSpPr>
+        <p:spPr>
+          <a:xfrm>
+            <a:off x="4108704" y="2134054"/>
+            <a:ext cx="1759093" cy="422353"/>
+          </a:xfrm>
+          <a:prstGeom prst="rightArrow">
+            <a:avLst/>
+          </a:prstGeom>
+        </p:spPr>
+        <p:style>
+          <a:lnRef idx="2">
+            <a:schemeClr val="accent1">
+              <a:shade val="50000"/>
+            </a:schemeClr>
+          </a:lnRef>
+          <a:fillRef idx="1">
+            <a:schemeClr val="accent1"/>
+          </a:fillRef>
+          <a:effectRef idx="0">
+            <a:schemeClr val="accent1"/>
+          </a:effectRef>
+          <a:fontRef idx="minor">
+            <a:schemeClr val="lt1"/>
+          </a:fontRef>
+        </p:style>
+        <p:txBody>
+          <a:bodyPr rtlCol="0" anchor="ctr"/>
+          <a:lstStyle/>
+          <a:p>
+            <a:pPr algn="ctr"/>
+            <a:endParaRPr kumimoji="1" lang="ja-JP" altLang="en-US"/>
+          </a:p>
+        </p:txBody>
+      </p:sp>
+      <p:pic>
+        <p:nvPicPr>
+          <p:cNvPr id="14" name="図 13"/>
+          <p:cNvPicPr>
+            <a:picLocks noChangeAspect="1"/>
+          </p:cNvPicPr>
+          <p:nvPr/>
+        </p:nvPicPr>
+        <p:blipFill>
+          <a:blip r:embed="rId4">
+            <a:extLst>
+              <a:ext uri="{28A0092B-C50C-407E-A947-70E740481C1C}">
+                <a14:useLocalDpi xmlns:a14="http://schemas.microsoft.com/office/drawing/2010/main" val="0"/>
+              </a:ext>
+            </a:extLst>
+          </a:blip>
+          <a:stretch>
+            <a:fillRect/>
+          </a:stretch>
+        </p:blipFill>
+        <p:spPr>
+          <a:xfrm>
+            <a:off x="4558600" y="1940683"/>
+            <a:ext cx="873910" cy="873910"/>
+          </a:xfrm>
+          <a:prstGeom prst="rect">
+            <a:avLst/>
+          </a:prstGeom>
+        </p:spPr>
+      </p:pic>
+      <p:sp>
+        <p:nvSpPr>
+          <p:cNvPr id="12" name="テキスト ボックス 11"/>
+          <p:cNvSpPr txBox="1"/>
+          <p:nvPr/>
+        </p:nvSpPr>
+        <p:spPr>
+          <a:xfrm>
+            <a:off x="5564319" y="1560400"/>
+            <a:ext cx="1415772" cy="1569660"/>
+          </a:xfrm>
+          <a:prstGeom prst="rect">
+            <a:avLst/>
+          </a:prstGeom>
+          <a:noFill/>
+        </p:spPr>
+        <p:txBody>
+          <a:bodyPr wrap="none" rtlCol="0">
+            <a:spAutoFit/>
+          </a:bodyPr>
+          <a:lstStyle/>
+          <a:p>
+            <a:r>
+              <a:rPr kumimoji="1" lang="en-US" altLang="ja-JP" sz="9600" dirty="0" smtClean="0">
+                <a:solidFill>
+                  <a:srgbClr val="FF0000"/>
+                </a:solidFill>
+              </a:rPr>
+              <a:t>×</a:t>
+            </a:r>
+            <a:endParaRPr kumimoji="1" lang="ja-JP" altLang="en-US" sz="9600" dirty="0">
+              <a:solidFill>
+                <a:srgbClr val="FF0000"/>
+              </a:solidFill>
+            </a:endParaRPr>
+          </a:p>
+        </p:txBody>
+      </p:sp>
+      <p:sp>
+        <p:nvSpPr>
+          <p:cNvPr id="16" name="テキスト ボックス 15"/>
+          <p:cNvSpPr txBox="1"/>
+          <p:nvPr/>
+        </p:nvSpPr>
+        <p:spPr>
+          <a:xfrm>
+            <a:off x="4548218" y="1560400"/>
+            <a:ext cx="808235" cy="369332"/>
+          </a:xfrm>
+          <a:prstGeom prst="rect">
+            <a:avLst/>
+          </a:prstGeom>
+          <a:noFill/>
+        </p:spPr>
+        <p:txBody>
+          <a:bodyPr wrap="none" rtlCol="0">
+            <a:spAutoFit/>
+          </a:bodyPr>
+          <a:lstStyle/>
+          <a:p>
+            <a:r>
+              <a:rPr kumimoji="1" lang="ja-JP" altLang="en-US" dirty="0" smtClean="0"/>
+              <a:t>ビルド</a:t>
+            </a:r>
+            <a:endParaRPr kumimoji="1" lang="ja-JP" altLang="en-US" dirty="0"/>
+          </a:p>
+        </p:txBody>
+      </p:sp>
+    </p:spTree>
+    <p:extLst>
+      <p:ext uri="{BB962C8B-B14F-4D97-AF65-F5344CB8AC3E}">
+        <p14:creationId xmlns:p14="http://schemas.microsoft.com/office/powerpoint/2010/main" val="1859412854"/>
       </p:ext>
     </p:extLst>
   </p:cSld>

</xml_diff>